<commit_message>
Python code, Word doc
</commit_message>
<xml_diff>
--- a/Design Architecture.pptx
+++ b/Design Architecture.pptx
@@ -274,7 +274,7 @@
           <a:p>
             <a:fld id="{6E2826EF-20C6-465C-87AC-C906D491A623}" type="datetimeFigureOut">
               <a:rPr lang="en-IN" smtClean="0"/>
-              <a:t>16-04-2022</a:t>
+              <a:t>20-04-2022</a:t>
             </a:fld>
             <a:endParaRPr lang="en-IN"/>
           </a:p>
@@ -474,7 +474,7 @@
           <a:p>
             <a:fld id="{6E2826EF-20C6-465C-87AC-C906D491A623}" type="datetimeFigureOut">
               <a:rPr lang="en-IN" smtClean="0"/>
-              <a:t>16-04-2022</a:t>
+              <a:t>20-04-2022</a:t>
             </a:fld>
             <a:endParaRPr lang="en-IN"/>
           </a:p>
@@ -684,7 +684,7 @@
           <a:p>
             <a:fld id="{6E2826EF-20C6-465C-87AC-C906D491A623}" type="datetimeFigureOut">
               <a:rPr lang="en-IN" smtClean="0"/>
-              <a:t>16-04-2022</a:t>
+              <a:t>20-04-2022</a:t>
             </a:fld>
             <a:endParaRPr lang="en-IN"/>
           </a:p>
@@ -884,7 +884,7 @@
           <a:p>
             <a:fld id="{6E2826EF-20C6-465C-87AC-C906D491A623}" type="datetimeFigureOut">
               <a:rPr lang="en-IN" smtClean="0"/>
-              <a:t>16-04-2022</a:t>
+              <a:t>20-04-2022</a:t>
             </a:fld>
             <a:endParaRPr lang="en-IN"/>
           </a:p>
@@ -1160,7 +1160,7 @@
           <a:p>
             <a:fld id="{6E2826EF-20C6-465C-87AC-C906D491A623}" type="datetimeFigureOut">
               <a:rPr lang="en-IN" smtClean="0"/>
-              <a:t>16-04-2022</a:t>
+              <a:t>20-04-2022</a:t>
             </a:fld>
             <a:endParaRPr lang="en-IN"/>
           </a:p>
@@ -1428,7 +1428,7 @@
           <a:p>
             <a:fld id="{6E2826EF-20C6-465C-87AC-C906D491A623}" type="datetimeFigureOut">
               <a:rPr lang="en-IN" smtClean="0"/>
-              <a:t>16-04-2022</a:t>
+              <a:t>20-04-2022</a:t>
             </a:fld>
             <a:endParaRPr lang="en-IN"/>
           </a:p>
@@ -1843,7 +1843,7 @@
           <a:p>
             <a:fld id="{6E2826EF-20C6-465C-87AC-C906D491A623}" type="datetimeFigureOut">
               <a:rPr lang="en-IN" smtClean="0"/>
-              <a:t>16-04-2022</a:t>
+              <a:t>20-04-2022</a:t>
             </a:fld>
             <a:endParaRPr lang="en-IN"/>
           </a:p>
@@ -1985,7 +1985,7 @@
           <a:p>
             <a:fld id="{6E2826EF-20C6-465C-87AC-C906D491A623}" type="datetimeFigureOut">
               <a:rPr lang="en-IN" smtClean="0"/>
-              <a:t>16-04-2022</a:t>
+              <a:t>20-04-2022</a:t>
             </a:fld>
             <a:endParaRPr lang="en-IN"/>
           </a:p>
@@ -2098,7 +2098,7 @@
           <a:p>
             <a:fld id="{6E2826EF-20C6-465C-87AC-C906D491A623}" type="datetimeFigureOut">
               <a:rPr lang="en-IN" smtClean="0"/>
-              <a:t>16-04-2022</a:t>
+              <a:t>20-04-2022</a:t>
             </a:fld>
             <a:endParaRPr lang="en-IN"/>
           </a:p>
@@ -2411,7 +2411,7 @@
           <a:p>
             <a:fld id="{6E2826EF-20C6-465C-87AC-C906D491A623}" type="datetimeFigureOut">
               <a:rPr lang="en-IN" smtClean="0"/>
-              <a:t>16-04-2022</a:t>
+              <a:t>20-04-2022</a:t>
             </a:fld>
             <a:endParaRPr lang="en-IN"/>
           </a:p>
@@ -2700,7 +2700,7 @@
           <a:p>
             <a:fld id="{6E2826EF-20C6-465C-87AC-C906D491A623}" type="datetimeFigureOut">
               <a:rPr lang="en-IN" smtClean="0"/>
-              <a:t>16-04-2022</a:t>
+              <a:t>20-04-2022</a:t>
             </a:fld>
             <a:endParaRPr lang="en-IN"/>
           </a:p>
@@ -2943,7 +2943,7 @@
           <a:p>
             <a:fld id="{6E2826EF-20C6-465C-87AC-C906D491A623}" type="datetimeFigureOut">
               <a:rPr lang="en-IN" smtClean="0"/>
-              <a:t>16-04-2022</a:t>
+              <a:t>20-04-2022</a:t>
             </a:fld>
             <a:endParaRPr lang="en-IN"/>
           </a:p>
@@ -4769,6 +4769,52 @@
               <a:t>US_Earthquake_Event</a:t>
             </a:r>
             <a:endParaRPr lang="en-IN" dirty="0"/>
+          </a:p>
+        </p:txBody>
+      </p:sp>
+      <p:sp>
+        <p:nvSpPr>
+          <p:cNvPr id="19" name="Cube 18">
+            <a:extLst>
+              <a:ext uri="{FF2B5EF4-FFF2-40B4-BE49-F238E27FC236}">
+                <a16:creationId xmlns:a16="http://schemas.microsoft.com/office/drawing/2014/main" id="{F3C142A4-F610-4E3D-8CAD-D7B4BD37F486}"/>
+              </a:ext>
+            </a:extLst>
+          </p:cNvPr>
+          <p:cNvSpPr/>
+          <p:nvPr/>
+        </p:nvSpPr>
+        <p:spPr>
+          <a:xfrm>
+            <a:off x="4468050" y="3158332"/>
+            <a:ext cx="45719" cy="45719"/>
+          </a:xfrm>
+          <a:prstGeom prst="cube">
+            <a:avLst/>
+          </a:prstGeom>
+        </p:spPr>
+        <p:style>
+          <a:lnRef idx="2">
+            <a:schemeClr val="accent1">
+              <a:shade val="50000"/>
+            </a:schemeClr>
+          </a:lnRef>
+          <a:fillRef idx="1">
+            <a:schemeClr val="accent1"/>
+          </a:fillRef>
+          <a:effectRef idx="0">
+            <a:schemeClr val="accent1"/>
+          </a:effectRef>
+          <a:fontRef idx="minor">
+            <a:schemeClr val="lt1"/>
+          </a:fontRef>
+        </p:style>
+        <p:txBody>
+          <a:bodyPr rtlCol="0" anchor="ctr"/>
+          <a:lstStyle/>
+          <a:p>
+            <a:pPr algn="ctr"/>
+            <a:endParaRPr lang="en-IN"/>
           </a:p>
         </p:txBody>
       </p:sp>

</xml_diff>